<commit_message>
Updated notes for me.
</commit_message>
<xml_diff>
--- a/Documents/source_documents/Presentation.pptx
+++ b/Documents/source_documents/Presentation.pptx
@@ -704,24 +704,20 @@
           <a:p>
             <a:r>
               <a:rPr lang="en-US" dirty="0" smtClean="0"/>
-              <a:t>Errors:</a:t>
-            </a:r>
-          </a:p>
-          <a:p>
-            <a:r>
-              <a:rPr lang="en-US" dirty="0" smtClean="0"/>
-              <a:t>* Low</a:t>
+              <a:t>EDE</a:t>
             </a:r>
             <a:r>
               <a:rPr lang="en-US" baseline="0" dirty="0" smtClean="0"/>
-              <a:t> Battery (blink yellow)</a:t>
+              <a:t> free to use. Graphical interface to simplify programming workload and design.</a:t>
             </a:r>
           </a:p>
           <a:p>
             <a:r>
               <a:rPr lang="en-US" baseline="0" dirty="0" smtClean="0"/>
-              <a:t>* Memory Full (red)</a:t>
-            </a:r>
+              <a:t>APIs. Option Windows. Build Project creates foundational code. Can modify from there.</a:t>
+            </a:r>
+          </a:p>
+          <a:p>
             <a:endParaRPr lang="en-US" dirty="0"/>
           </a:p>
         </p:txBody>
@@ -743,7 +739,7 @@
           <a:p>
             <a:fld id="{80A39CBA-3246-41BD-B461-7A6F199FC541}" type="slidenum">
               <a:rPr lang="en-US" smtClean="0"/>
-              <a:t>17</a:t>
+              <a:t>15</a:t>
             </a:fld>
             <a:endParaRPr lang="en-US"/>
           </a:p>
@@ -752,7 +748,7 @@
     </p:spTree>
     <p:extLst>
       <p:ext uri="{BB962C8B-B14F-4D97-AF65-F5344CB8AC3E}">
-        <p14:creationId xmlns:p14="http://schemas.microsoft.com/office/powerpoint/2010/main" val="2367590032"/>
+        <p14:creationId xmlns:p14="http://schemas.microsoft.com/office/powerpoint/2010/main" val="2949825411"/>
       </p:ext>
     </p:extLst>
   </p:cSld>
@@ -808,7 +804,59 @@
           <a:p>
             <a:r>
               <a:rPr lang="en-US" dirty="0" smtClean="0"/>
-              <a:t>Scott starts</a:t>
+              <a:t>Keep basic.</a:t>
+            </a:r>
+          </a:p>
+          <a:p>
+            <a:r>
+              <a:rPr lang="en-US" dirty="0" smtClean="0"/>
+              <a:t>Wakes up every second to check for interrupt. </a:t>
+            </a:r>
+          </a:p>
+          <a:p>
+            <a:endParaRPr lang="en-US" dirty="0" smtClean="0"/>
+          </a:p>
+          <a:p>
+            <a:r>
+              <a:rPr lang="en-US" dirty="0" smtClean="0"/>
+              <a:t>Pointers</a:t>
+            </a:r>
+          </a:p>
+          <a:p>
+            <a:r>
+              <a:rPr lang="en-US" dirty="0" smtClean="0"/>
+              <a:t>Flash</a:t>
+            </a:r>
+          </a:p>
+          <a:p>
+            <a:r>
+              <a:rPr lang="en-US" dirty="0" smtClean="0"/>
+              <a:t>Interrupts.</a:t>
+            </a:r>
+          </a:p>
+          <a:p>
+            <a:r>
+              <a:rPr lang="en-US" dirty="0" smtClean="0"/>
+              <a:t>R2C Sampling</a:t>
+            </a:r>
+          </a:p>
+          <a:p>
+            <a:endParaRPr lang="en-US" dirty="0" smtClean="0"/>
+          </a:p>
+          <a:p>
+            <a:r>
+              <a:rPr lang="en-US" dirty="0" smtClean="0"/>
+              <a:t>Buttons interrupt.</a:t>
+            </a:r>
+          </a:p>
+          <a:p>
+            <a:r>
+              <a:rPr lang="en-US" dirty="0" smtClean="0"/>
+              <a:t>Once set up sleeps . Every second wakes up to check for flags.</a:t>
+            </a:r>
+            <a:r>
+              <a:rPr lang="en-US" baseline="0" dirty="0" smtClean="0"/>
+              <a:t> </a:t>
             </a:r>
             <a:endParaRPr lang="en-US" dirty="0"/>
           </a:p>
@@ -831,7 +879,7 @@
           <a:p>
             <a:fld id="{80A39CBA-3246-41BD-B461-7A6F199FC541}" type="slidenum">
               <a:rPr lang="en-US" smtClean="0"/>
-              <a:t>18</a:t>
+              <a:t>16</a:t>
             </a:fld>
             <a:endParaRPr lang="en-US"/>
           </a:p>
@@ -840,7 +888,7 @@
     </p:spTree>
     <p:extLst>
       <p:ext uri="{BB962C8B-B14F-4D97-AF65-F5344CB8AC3E}">
-        <p14:creationId xmlns:p14="http://schemas.microsoft.com/office/powerpoint/2010/main" val="2972674611"/>
+        <p14:creationId xmlns:p14="http://schemas.microsoft.com/office/powerpoint/2010/main" val="3829864215"/>
       </p:ext>
     </p:extLst>
   </p:cSld>
@@ -894,6 +942,101 @@
           <a:bodyPr/>
           <a:lstStyle/>
           <a:p>
+            <a:r>
+              <a:rPr lang="en-US" dirty="0" smtClean="0"/>
+              <a:t>Sample:</a:t>
+            </a:r>
+          </a:p>
+          <a:p>
+            <a:r>
+              <a:rPr lang="en-US" dirty="0" smtClean="0"/>
+              <a:t>Blue blink</a:t>
+            </a:r>
+          </a:p>
+          <a:p>
+            <a:r>
+              <a:rPr lang="en-US" dirty="0" smtClean="0"/>
+              <a:t>Errors</a:t>
+            </a:r>
+            <a:r>
+              <a:rPr lang="en-US" dirty="0" smtClean="0"/>
+              <a:t>:</a:t>
+            </a:r>
+          </a:p>
+          <a:p>
+            <a:r>
+              <a:rPr lang="en-US" dirty="0" smtClean="0"/>
+              <a:t>* Low</a:t>
+            </a:r>
+            <a:r>
+              <a:rPr lang="en-US" baseline="0" dirty="0" smtClean="0"/>
+              <a:t> Battery (blink yellow)</a:t>
+            </a:r>
+          </a:p>
+          <a:p>
+            <a:pPr marL="171450" indent="-171450">
+              <a:buFont typeface="Arial" panose="020B0604020202020204" pitchFamily="34" charset="0"/>
+              <a:buChar char="•"/>
+            </a:pPr>
+            <a:r>
+              <a:rPr lang="en-US" baseline="0" dirty="0" smtClean="0"/>
+              <a:t>Memory </a:t>
+            </a:r>
+            <a:r>
+              <a:rPr lang="en-US" baseline="0" dirty="0" smtClean="0"/>
+              <a:t>Full (red</a:t>
+            </a:r>
+            <a:r>
+              <a:rPr lang="en-US" baseline="0" dirty="0" smtClean="0"/>
+              <a:t>)</a:t>
+            </a:r>
+          </a:p>
+          <a:p>
+            <a:pPr marL="0" indent="0">
+              <a:buFont typeface="Arial" panose="020B0604020202020204" pitchFamily="34" charset="0"/>
+              <a:buNone/>
+            </a:pPr>
+            <a:r>
+              <a:rPr lang="en-US" baseline="0" dirty="0" smtClean="0"/>
+              <a:t>USB</a:t>
+            </a:r>
+          </a:p>
+          <a:p>
+            <a:pPr marL="0" indent="0">
+              <a:buFont typeface="Arial" panose="020B0604020202020204" pitchFamily="34" charset="0"/>
+              <a:buNone/>
+            </a:pPr>
+            <a:r>
+              <a:rPr lang="en-US" baseline="0" dirty="0" smtClean="0"/>
+              <a:t>Solid teal</a:t>
+            </a:r>
+          </a:p>
+          <a:p>
+            <a:pPr marL="0" indent="0">
+              <a:buFont typeface="Arial" panose="020B0604020202020204" pitchFamily="34" charset="0"/>
+              <a:buNone/>
+            </a:pPr>
+            <a:endParaRPr lang="en-US" baseline="0" dirty="0" smtClean="0"/>
+          </a:p>
+          <a:p>
+            <a:pPr marL="0" indent="0">
+              <a:buFont typeface="Arial" panose="020B0604020202020204" pitchFamily="34" charset="0"/>
+              <a:buNone/>
+            </a:pPr>
+            <a:r>
+              <a:rPr lang="en-US" baseline="0" dirty="0" smtClean="0"/>
+              <a:t>1 Second check. No faster</a:t>
+            </a:r>
+          </a:p>
+          <a:p>
+            <a:pPr marL="0" indent="0">
+              <a:buFont typeface="Arial" panose="020B0604020202020204" pitchFamily="34" charset="0"/>
+              <a:buNone/>
+            </a:pPr>
+            <a:r>
+              <a:rPr lang="en-US" baseline="0" dirty="0" smtClean="0"/>
+              <a:t>Counter logic for timed samples</a:t>
+            </a:r>
             <a:endParaRPr lang="en-US" dirty="0"/>
           </a:p>
         </p:txBody>
@@ -915,7 +1058,7 @@
           <a:p>
             <a:fld id="{80A39CBA-3246-41BD-B461-7A6F199FC541}" type="slidenum">
               <a:rPr lang="en-US" smtClean="0"/>
-              <a:t>20</a:t>
+              <a:t>17</a:t>
             </a:fld>
             <a:endParaRPr lang="en-US"/>
           </a:p>
@@ -924,7 +1067,7 @@
     </p:spTree>
     <p:extLst>
       <p:ext uri="{BB962C8B-B14F-4D97-AF65-F5344CB8AC3E}">
-        <p14:creationId xmlns:p14="http://schemas.microsoft.com/office/powerpoint/2010/main" val="195832879"/>
+        <p14:creationId xmlns:p14="http://schemas.microsoft.com/office/powerpoint/2010/main" val="2367590032"/>
       </p:ext>
     </p:extLst>
   </p:cSld>
@@ -980,16 +1123,7 @@
           <a:p>
             <a:r>
               <a:rPr lang="en-US" dirty="0" smtClean="0"/>
-              <a:t>Hand out documents</a:t>
-            </a:r>
-          </a:p>
-          <a:p>
-            <a:endParaRPr lang="en-US" dirty="0" smtClean="0"/>
-          </a:p>
-          <a:p>
-            <a:r>
-              <a:rPr lang="en-US" dirty="0" smtClean="0"/>
-              <a:t>Stop example experiment and process data</a:t>
+              <a:t>Scott starts</a:t>
             </a:r>
             <a:endParaRPr lang="en-US" dirty="0"/>
           </a:p>
@@ -1012,7 +1146,7 @@
           <a:p>
             <a:fld id="{80A39CBA-3246-41BD-B461-7A6F199FC541}" type="slidenum">
               <a:rPr lang="en-US" smtClean="0"/>
-              <a:t>21</a:t>
+              <a:t>18</a:t>
             </a:fld>
             <a:endParaRPr lang="en-US"/>
           </a:p>
@@ -1021,7 +1155,7 @@
     </p:spTree>
     <p:extLst>
       <p:ext uri="{BB962C8B-B14F-4D97-AF65-F5344CB8AC3E}">
-        <p14:creationId xmlns:p14="http://schemas.microsoft.com/office/powerpoint/2010/main" val="3155228114"/>
+        <p14:creationId xmlns:p14="http://schemas.microsoft.com/office/powerpoint/2010/main" val="2972674611"/>
       </p:ext>
     </p:extLst>
   </p:cSld>
@@ -1075,10 +1209,6 @@
           <a:bodyPr/>
           <a:lstStyle/>
           <a:p>
-            <a:r>
-              <a:rPr lang="en-US" dirty="0" smtClean="0"/>
-              <a:t>Start handing out documentation</a:t>
-            </a:r>
             <a:endParaRPr lang="en-US" dirty="0"/>
           </a:p>
         </p:txBody>
@@ -1100,7 +1230,7 @@
           <a:p>
             <a:fld id="{80A39CBA-3246-41BD-B461-7A6F199FC541}" type="slidenum">
               <a:rPr lang="en-US" smtClean="0"/>
-              <a:t>22</a:t>
+              <a:t>20</a:t>
             </a:fld>
             <a:endParaRPr lang="en-US"/>
           </a:p>
@@ -1109,7 +1239,7 @@
     </p:spTree>
     <p:extLst>
       <p:ext uri="{BB962C8B-B14F-4D97-AF65-F5344CB8AC3E}">
-        <p14:creationId xmlns:p14="http://schemas.microsoft.com/office/powerpoint/2010/main" val="3155165605"/>
+        <p14:creationId xmlns:p14="http://schemas.microsoft.com/office/powerpoint/2010/main" val="195832879"/>
       </p:ext>
     </p:extLst>
   </p:cSld>
@@ -1165,7 +1295,16 @@
           <a:p>
             <a:r>
               <a:rPr lang="en-US" dirty="0" smtClean="0"/>
-              <a:t>Bryan starts</a:t>
+              <a:t>Hand out documents</a:t>
+            </a:r>
+          </a:p>
+          <a:p>
+            <a:endParaRPr lang="en-US" dirty="0" smtClean="0"/>
+          </a:p>
+          <a:p>
+            <a:r>
+              <a:rPr lang="en-US" dirty="0" smtClean="0"/>
+              <a:t>Stop example experiment and process data</a:t>
             </a:r>
             <a:endParaRPr lang="en-US" dirty="0"/>
           </a:p>
@@ -1188,7 +1327,7 @@
           <a:p>
             <a:fld id="{80A39CBA-3246-41BD-B461-7A6F199FC541}" type="slidenum">
               <a:rPr lang="en-US" smtClean="0"/>
-              <a:t>24</a:t>
+              <a:t>21</a:t>
             </a:fld>
             <a:endParaRPr lang="en-US"/>
           </a:p>
@@ -1197,7 +1336,7 @@
     </p:spTree>
     <p:extLst>
       <p:ext uri="{BB962C8B-B14F-4D97-AF65-F5344CB8AC3E}">
-        <p14:creationId xmlns:p14="http://schemas.microsoft.com/office/powerpoint/2010/main" val="4218839055"/>
+        <p14:creationId xmlns:p14="http://schemas.microsoft.com/office/powerpoint/2010/main" val="3155228114"/>
       </p:ext>
     </p:extLst>
   </p:cSld>
@@ -1253,11 +1392,7 @@
           <a:p>
             <a:r>
               <a:rPr lang="en-US" dirty="0" smtClean="0"/>
-              <a:t>Current</a:t>
-            </a:r>
-            <a:r>
-              <a:rPr lang="en-US" baseline="0" dirty="0" smtClean="0"/>
-              <a:t> RTC loses time when power is lost</a:t>
+              <a:t>Start handing out documentation</a:t>
             </a:r>
             <a:endParaRPr lang="en-US" dirty="0"/>
           </a:p>
@@ -1280,7 +1415,7 @@
           <a:p>
             <a:fld id="{80A39CBA-3246-41BD-B461-7A6F199FC541}" type="slidenum">
               <a:rPr lang="en-US" smtClean="0"/>
-              <a:t>25</a:t>
+              <a:t>22</a:t>
             </a:fld>
             <a:endParaRPr lang="en-US"/>
           </a:p>
@@ -1289,7 +1424,7 @@
     </p:spTree>
     <p:extLst>
       <p:ext uri="{BB962C8B-B14F-4D97-AF65-F5344CB8AC3E}">
-        <p14:creationId xmlns:p14="http://schemas.microsoft.com/office/powerpoint/2010/main" val="2045565765"/>
+        <p14:creationId xmlns:p14="http://schemas.microsoft.com/office/powerpoint/2010/main" val="3155165605"/>
       </p:ext>
     </p:extLst>
   </p:cSld>
@@ -1343,6 +1478,10 @@
           <a:bodyPr/>
           <a:lstStyle/>
           <a:p>
+            <a:r>
+              <a:rPr lang="en-US" dirty="0" smtClean="0"/>
+              <a:t>Bryan starts</a:t>
+            </a:r>
             <a:endParaRPr lang="en-US" dirty="0"/>
           </a:p>
         </p:txBody>
@@ -1364,7 +1503,7 @@
           <a:p>
             <a:fld id="{80A39CBA-3246-41BD-B461-7A6F199FC541}" type="slidenum">
               <a:rPr lang="en-US" smtClean="0"/>
-              <a:t>26</a:t>
+              <a:t>24</a:t>
             </a:fld>
             <a:endParaRPr lang="en-US"/>
           </a:p>
@@ -1373,7 +1512,7 @@
     </p:spTree>
     <p:extLst>
       <p:ext uri="{BB962C8B-B14F-4D97-AF65-F5344CB8AC3E}">
-        <p14:creationId xmlns:p14="http://schemas.microsoft.com/office/powerpoint/2010/main" val="665995865"/>
+        <p14:creationId xmlns:p14="http://schemas.microsoft.com/office/powerpoint/2010/main" val="4218839055"/>
       </p:ext>
     </p:extLst>
   </p:cSld>
@@ -1427,27 +1566,15 @@
           <a:bodyPr/>
           <a:lstStyle/>
           <a:p>
-            <a:pPr marL="0" marR="0" indent="0" algn="l" defTabSz="914400" rtl="0" eaLnBrk="1" fontAlgn="auto" latinLnBrk="0" hangingPunct="1">
-              <a:lnSpc>
-                <a:spcPct val="100000"/>
-              </a:lnSpc>
-              <a:spcBef>
-                <a:spcPts val="0"/>
-              </a:spcBef>
-              <a:spcAft>
-                <a:spcPts val="0"/>
-              </a:spcAft>
-              <a:buClrTx/>
-              <a:buSzTx/>
-              <a:buFontTx/>
-              <a:buNone/>
-              <a:tabLst/>
-              <a:defRPr/>
-            </a:pPr>
-            <a:r>
-              <a:rPr lang="en-US" dirty="0" smtClean="0"/>
-              <a:t>Answer questions</a:t>
-            </a:r>
+            <a:r>
+              <a:rPr lang="en-US" dirty="0" smtClean="0"/>
+              <a:t>Current</a:t>
+            </a:r>
+            <a:r>
+              <a:rPr lang="en-US" baseline="0" dirty="0" smtClean="0"/>
+              <a:t> RTC loses time when power is lost</a:t>
+            </a:r>
+            <a:endParaRPr lang="en-US" dirty="0"/>
           </a:p>
         </p:txBody>
       </p:sp>
@@ -1468,7 +1595,7 @@
           <a:p>
             <a:fld id="{80A39CBA-3246-41BD-B461-7A6F199FC541}" type="slidenum">
               <a:rPr lang="en-US" smtClean="0"/>
-              <a:t>27</a:t>
+              <a:t>25</a:t>
             </a:fld>
             <a:endParaRPr lang="en-US"/>
           </a:p>
@@ -1477,7 +1604,91 @@
     </p:spTree>
     <p:extLst>
       <p:ext uri="{BB962C8B-B14F-4D97-AF65-F5344CB8AC3E}">
-        <p14:creationId xmlns:p14="http://schemas.microsoft.com/office/powerpoint/2010/main" val="2737554237"/>
+        <p14:creationId xmlns:p14="http://schemas.microsoft.com/office/powerpoint/2010/main" val="2045565765"/>
+      </p:ext>
+    </p:extLst>
+  </p:cSld>
+  <p:clrMapOvr>
+    <a:masterClrMapping/>
+  </p:clrMapOvr>
+</p:notes>
+</file>
+
+<file path=ppt/notesSlides/notesSlide19.xml><?xml version="1.0" encoding="utf-8"?>
+<p:notes xmlns:a="http://schemas.openxmlformats.org/drawingml/2006/main" xmlns:r="http://schemas.openxmlformats.org/officeDocument/2006/relationships" xmlns:p="http://schemas.openxmlformats.org/presentationml/2006/main">
+  <p:cSld>
+    <p:spTree>
+      <p:nvGrpSpPr>
+        <p:cNvPr id="1" name=""/>
+        <p:cNvGrpSpPr/>
+        <p:nvPr/>
+      </p:nvGrpSpPr>
+      <p:grpSpPr>
+        <a:xfrm>
+          <a:off x="0" y="0"/>
+          <a:ext cx="0" cy="0"/>
+          <a:chOff x="0" y="0"/>
+          <a:chExt cx="0" cy="0"/>
+        </a:xfrm>
+      </p:grpSpPr>
+      <p:sp>
+        <p:nvSpPr>
+          <p:cNvPr id="2" name="Slide Image Placeholder 1"/>
+          <p:cNvSpPr>
+            <a:spLocks noGrp="1" noRot="1" noChangeAspect="1"/>
+          </p:cNvSpPr>
+          <p:nvPr>
+            <p:ph type="sldImg"/>
+          </p:nvPr>
+        </p:nvSpPr>
+        <p:spPr/>
+      </p:sp>
+      <p:sp>
+        <p:nvSpPr>
+          <p:cNvPr id="3" name="Notes Placeholder 2"/>
+          <p:cNvSpPr>
+            <a:spLocks noGrp="1"/>
+          </p:cNvSpPr>
+          <p:nvPr>
+            <p:ph type="body" idx="1"/>
+          </p:nvPr>
+        </p:nvSpPr>
+        <p:spPr/>
+        <p:txBody>
+          <a:bodyPr/>
+          <a:lstStyle/>
+          <a:p>
+            <a:endParaRPr lang="en-US" dirty="0"/>
+          </a:p>
+        </p:txBody>
+      </p:sp>
+      <p:sp>
+        <p:nvSpPr>
+          <p:cNvPr id="4" name="Slide Number Placeholder 3"/>
+          <p:cNvSpPr>
+            <a:spLocks noGrp="1"/>
+          </p:cNvSpPr>
+          <p:nvPr>
+            <p:ph type="sldNum" sz="quarter" idx="10"/>
+          </p:nvPr>
+        </p:nvSpPr>
+        <p:spPr/>
+        <p:txBody>
+          <a:bodyPr/>
+          <a:lstStyle/>
+          <a:p>
+            <a:fld id="{80A39CBA-3246-41BD-B461-7A6F199FC541}" type="slidenum">
+              <a:rPr lang="en-US" smtClean="0"/>
+              <a:t>26</a:t>
+            </a:fld>
+            <a:endParaRPr lang="en-US"/>
+          </a:p>
+        </p:txBody>
+      </p:sp>
+    </p:spTree>
+    <p:extLst>
+      <p:ext uri="{BB962C8B-B14F-4D97-AF65-F5344CB8AC3E}">
+        <p14:creationId xmlns:p14="http://schemas.microsoft.com/office/powerpoint/2010/main" val="665995865"/>
       </p:ext>
     </p:extLst>
   </p:cSld>
@@ -1562,6 +1773,110 @@
     <p:extLst>
       <p:ext uri="{BB962C8B-B14F-4D97-AF65-F5344CB8AC3E}">
         <p14:creationId xmlns:p14="http://schemas.microsoft.com/office/powerpoint/2010/main" val="3587962732"/>
+      </p:ext>
+    </p:extLst>
+  </p:cSld>
+  <p:clrMapOvr>
+    <a:masterClrMapping/>
+  </p:clrMapOvr>
+</p:notes>
+</file>
+
+<file path=ppt/notesSlides/notesSlide20.xml><?xml version="1.0" encoding="utf-8"?>
+<p:notes xmlns:a="http://schemas.openxmlformats.org/drawingml/2006/main" xmlns:r="http://schemas.openxmlformats.org/officeDocument/2006/relationships" xmlns:p="http://schemas.openxmlformats.org/presentationml/2006/main">
+  <p:cSld>
+    <p:spTree>
+      <p:nvGrpSpPr>
+        <p:cNvPr id="1" name=""/>
+        <p:cNvGrpSpPr/>
+        <p:nvPr/>
+      </p:nvGrpSpPr>
+      <p:grpSpPr>
+        <a:xfrm>
+          <a:off x="0" y="0"/>
+          <a:ext cx="0" cy="0"/>
+          <a:chOff x="0" y="0"/>
+          <a:chExt cx="0" cy="0"/>
+        </a:xfrm>
+      </p:grpSpPr>
+      <p:sp>
+        <p:nvSpPr>
+          <p:cNvPr id="2" name="Slide Image Placeholder 1"/>
+          <p:cNvSpPr>
+            <a:spLocks noGrp="1" noRot="1" noChangeAspect="1"/>
+          </p:cNvSpPr>
+          <p:nvPr>
+            <p:ph type="sldImg"/>
+          </p:nvPr>
+        </p:nvSpPr>
+        <p:spPr/>
+      </p:sp>
+      <p:sp>
+        <p:nvSpPr>
+          <p:cNvPr id="3" name="Notes Placeholder 2"/>
+          <p:cNvSpPr>
+            <a:spLocks noGrp="1"/>
+          </p:cNvSpPr>
+          <p:nvPr>
+            <p:ph type="body" idx="1"/>
+          </p:nvPr>
+        </p:nvSpPr>
+        <p:spPr/>
+        <p:txBody>
+          <a:bodyPr/>
+          <a:lstStyle/>
+          <a:p>
+            <a:pPr marL="0" marR="0" indent="0" algn="l" defTabSz="914400" rtl="0" eaLnBrk="1" fontAlgn="auto" latinLnBrk="0" hangingPunct="1">
+              <a:lnSpc>
+                <a:spcPct val="100000"/>
+              </a:lnSpc>
+              <a:spcBef>
+                <a:spcPts val="0"/>
+              </a:spcBef>
+              <a:spcAft>
+                <a:spcPts val="0"/>
+              </a:spcAft>
+              <a:buClrTx/>
+              <a:buSzTx/>
+              <a:buFontTx/>
+              <a:buNone/>
+              <a:tabLst/>
+              <a:defRPr/>
+            </a:pPr>
+            <a:r>
+              <a:rPr lang="en-US" dirty="0" smtClean="0"/>
+              <a:t>Answer questions</a:t>
+            </a:r>
+          </a:p>
+        </p:txBody>
+      </p:sp>
+      <p:sp>
+        <p:nvSpPr>
+          <p:cNvPr id="4" name="Slide Number Placeholder 3"/>
+          <p:cNvSpPr>
+            <a:spLocks noGrp="1"/>
+          </p:cNvSpPr>
+          <p:nvPr>
+            <p:ph type="sldNum" sz="quarter" idx="10"/>
+          </p:nvPr>
+        </p:nvSpPr>
+        <p:spPr/>
+        <p:txBody>
+          <a:bodyPr/>
+          <a:lstStyle/>
+          <a:p>
+            <a:fld id="{80A39CBA-3246-41BD-B461-7A6F199FC541}" type="slidenum">
+              <a:rPr lang="en-US" smtClean="0"/>
+              <a:t>27</a:t>
+            </a:fld>
+            <a:endParaRPr lang="en-US"/>
+          </a:p>
+        </p:txBody>
+      </p:sp>
+    </p:spTree>
+    <p:extLst>
+      <p:ext uri="{BB962C8B-B14F-4D97-AF65-F5344CB8AC3E}">
+        <p14:creationId xmlns:p14="http://schemas.microsoft.com/office/powerpoint/2010/main" val="2737554237"/>
       </p:ext>
     </p:extLst>
   </p:cSld>
@@ -2139,8 +2454,41 @@
           <a:p>
             <a:r>
               <a:rPr lang="en-US" dirty="0" smtClean="0"/>
-              <a:t>Max starts</a:t>
-            </a:r>
+              <a:t>Max </a:t>
+            </a:r>
+            <a:r>
+              <a:rPr lang="en-US" dirty="0" smtClean="0"/>
+              <a:t>starts:</a:t>
+            </a:r>
+          </a:p>
+          <a:p>
+            <a:r>
+              <a:rPr lang="en-US" dirty="0" smtClean="0"/>
+              <a:t>All</a:t>
+            </a:r>
+            <a:r>
+              <a:rPr lang="en-US" baseline="0" dirty="0" smtClean="0"/>
+              <a:t> had experience with Arduino.</a:t>
+            </a:r>
+            <a:endParaRPr lang="en-US" dirty="0" smtClean="0"/>
+          </a:p>
+          <a:p>
+            <a:r>
+              <a:rPr lang="en-US" dirty="0" smtClean="0"/>
+              <a:t>Three</a:t>
+            </a:r>
+            <a:r>
+              <a:rPr lang="en-US" baseline="0" dirty="0" smtClean="0"/>
+              <a:t> with basic programming skills.</a:t>
+            </a:r>
+          </a:p>
+          <a:p>
+            <a:r>
+              <a:rPr lang="en-US" baseline="0" dirty="0" smtClean="0"/>
+              <a:t>Needed something easy to program and could handle all we needed.</a:t>
+            </a:r>
+          </a:p>
+          <a:p>
             <a:endParaRPr lang="en-US" dirty="0"/>
           </a:p>
         </p:txBody>
@@ -2225,6 +2573,38 @@
           <a:bodyPr/>
           <a:lstStyle/>
           <a:p>
+            <a:r>
+              <a:rPr lang="en-US" dirty="0" smtClean="0"/>
+              <a:t>Universal</a:t>
+            </a:r>
+            <a:r>
+              <a:rPr lang="en-US" baseline="0" dirty="0" smtClean="0"/>
+              <a:t> GPIO </a:t>
+            </a:r>
+          </a:p>
+          <a:p>
+            <a:r>
+              <a:rPr lang="en-US" baseline="0" dirty="0" smtClean="0"/>
+              <a:t>Analog Digital</a:t>
+            </a:r>
+          </a:p>
+          <a:p>
+            <a:r>
+              <a:rPr lang="en-US" baseline="0" dirty="0" smtClean="0"/>
+              <a:t>Multiplexed  ADC</a:t>
+            </a:r>
+          </a:p>
+          <a:p>
+            <a:r>
+              <a:rPr lang="en-US" baseline="0" dirty="0" smtClean="0"/>
+              <a:t>Programmable Gain</a:t>
+            </a:r>
+          </a:p>
+          <a:p>
+            <a:r>
+              <a:rPr lang="en-US" baseline="0" dirty="0" smtClean="0"/>
+              <a:t>Configurable Logic</a:t>
+            </a:r>
             <a:endParaRPr lang="en-US" dirty="0"/>
           </a:p>
         </p:txBody>
@@ -2246,7 +2626,7 @@
           <a:p>
             <a:fld id="{80A39CBA-3246-41BD-B461-7A6F199FC541}" type="slidenum">
               <a:rPr lang="en-US" smtClean="0"/>
-              <a:t>15</a:t>
+              <a:t>13</a:t>
             </a:fld>
             <a:endParaRPr lang="en-US"/>
           </a:p>
@@ -2255,7 +2635,7 @@
     </p:spTree>
     <p:extLst>
       <p:ext uri="{BB962C8B-B14F-4D97-AF65-F5344CB8AC3E}">
-        <p14:creationId xmlns:p14="http://schemas.microsoft.com/office/powerpoint/2010/main" val="2949825411"/>
+        <p14:creationId xmlns:p14="http://schemas.microsoft.com/office/powerpoint/2010/main" val="1423462918"/>
       </p:ext>
     </p:extLst>
   </p:cSld>
@@ -6450,7 +6830,7 @@
           <p:nvPr/>
         </p:nvPicPr>
         <p:blipFill>
-          <a:blip r:embed="rId2" cstate="print">
+          <a:blip r:embed="rId3" cstate="print">
             <a:extLst>
               <a:ext uri="{28A0092B-C50C-407E-A947-70E740481C1C}">
                 <a14:useLocalDpi xmlns:a14="http://schemas.microsoft.com/office/drawing/2010/main" val="0"/>
@@ -7182,25 +7562,25 @@
           <p:nvPr>
             <p:extLst>
               <p:ext uri="{D42A27DB-BD31-4B8C-83A1-F6EECF244321}">
-                <p14:modId xmlns:p14="http://schemas.microsoft.com/office/powerpoint/2010/main" val="3477684574"/>
+                <p14:modId xmlns:p14="http://schemas.microsoft.com/office/powerpoint/2010/main" val="771757372"/>
               </p:ext>
             </p:extLst>
           </p:nvPr>
         </p:nvGraphicFramePr>
         <p:xfrm>
-          <a:off x="312737" y="1257299"/>
+          <a:off x="350837" y="1257299"/>
           <a:ext cx="4556125" cy="4686300"/>
         </p:xfrm>
         <a:graphic>
           <a:graphicData uri="http://schemas.openxmlformats.org/presentationml/2006/ole">
             <mc:AlternateContent xmlns:mc="http://schemas.openxmlformats.org/markup-compatibility/2006">
               <mc:Choice xmlns:v="urn:schemas-microsoft-com:vml" Requires="v">
-                <p:oleObj spid="_x0000_s1042" r:id="rId3" imgW="6105482" imgH="6286618" progId="Visio.Drawing.15">
+                <p:oleObj spid="_x0000_s1048" name="Visio" r:id="rId4" imgW="6105857" imgH="6286760" progId="Visio.Drawing.15">
                   <p:embed/>
                 </p:oleObj>
               </mc:Choice>
               <mc:Fallback>
-                <p:oleObj r:id="rId3" imgW="6105482" imgH="6286618" progId="Visio.Drawing.15">
+                <p:oleObj name="Visio" r:id="rId4" imgW="6105857" imgH="6286760" progId="Visio.Drawing.15">
                   <p:embed/>
                   <p:pic>
                     <p:nvPicPr>
@@ -7211,13 +7591,7 @@
                       <p:nvPr/>
                     </p:nvPicPr>
                     <p:blipFill>
-                      <a:blip r:embed="rId4">
-                        <a:extLst>
-                          <a:ext uri="{28A0092B-C50C-407E-A947-70E740481C1C}">
-                            <a14:useLocalDpi xmlns:a14="http://schemas.microsoft.com/office/drawing/2010/main" val="0"/>
-                          </a:ext>
-                        </a:extLst>
-                      </a:blip>
+                      <a:blip r:embed="rId5"/>
                       <a:srcRect/>
                       <a:stretch>
                         <a:fillRect/>
@@ -7225,7 +7599,7 @@
                     </p:blipFill>
                     <p:spPr bwMode="auto">
                       <a:xfrm>
-                        <a:off x="312737" y="1257299"/>
+                        <a:off x="350837" y="1257299"/>
                         <a:ext cx="4556125" cy="4686300"/>
                       </a:xfrm>
                       <a:prstGeom prst="rect">
@@ -7415,11 +7789,7 @@
           <a:p>
             <a:r>
               <a:rPr lang="en-US" dirty="0" smtClean="0"/>
-              <a:t>LED </a:t>
-            </a:r>
-            <a:r>
-              <a:rPr lang="en-US" dirty="0" smtClean="0"/>
-              <a:t>System Indicator</a:t>
+              <a:t>LED System Indicator</a:t>
             </a:r>
           </a:p>
           <a:p>
@@ -7428,7 +7798,6 @@
               <a:rPr lang="en-US" dirty="0" smtClean="0"/>
               <a:t>Sample</a:t>
             </a:r>
-            <a:endParaRPr lang="en-US" dirty="0" smtClean="0"/>
           </a:p>
           <a:p>
             <a:pPr lvl="1"/>
@@ -7436,17 +7805,12 @@
               <a:rPr lang="en-US" dirty="0" smtClean="0"/>
               <a:t>Error</a:t>
             </a:r>
-            <a:endParaRPr lang="en-US" dirty="0" smtClean="0"/>
           </a:p>
           <a:p>
             <a:pPr lvl="1"/>
             <a:r>
               <a:rPr lang="en-US" dirty="0" smtClean="0"/>
-              <a:t>USB </a:t>
-            </a:r>
-            <a:r>
-              <a:rPr lang="en-US" dirty="0" smtClean="0"/>
-              <a:t>Connected</a:t>
+              <a:t>USB Connected</a:t>
             </a:r>
           </a:p>
           <a:p>
@@ -7855,16 +8219,11 @@
               <a:rPr lang="en-US" dirty="0" smtClean="0"/>
               <a:t>Sample Settings</a:t>
             </a:r>
-            <a:endParaRPr lang="en-US" dirty="0" smtClean="0"/>
-          </a:p>
-          <a:p>
-            <a:r>
-              <a:rPr lang="en-US" dirty="0" smtClean="0"/>
-              <a:t>Reference and </a:t>
-            </a:r>
-            <a:r>
-              <a:rPr lang="en-US" dirty="0" smtClean="0"/>
-              <a:t>Documentation</a:t>
+          </a:p>
+          <a:p>
+            <a:r>
+              <a:rPr lang="en-US" dirty="0" smtClean="0"/>
+              <a:t>Reference and Documentation</a:t>
             </a:r>
           </a:p>
         </p:txBody>
@@ -8615,25 +8974,13 @@
           <a:p>
             <a:r>
               <a:rPr lang="en-US" dirty="0" smtClean="0"/>
-              <a:t>User </a:t>
-            </a:r>
-            <a:r>
-              <a:rPr lang="en-US" dirty="0" smtClean="0"/>
-              <a:t>Manual</a:t>
-            </a:r>
-          </a:p>
-          <a:p>
-            <a:r>
-              <a:rPr lang="en-US" dirty="0" smtClean="0"/>
-              <a:t>Fundamentals </a:t>
-            </a:r>
-            <a:r>
-              <a:rPr lang="en-US" dirty="0" smtClean="0"/>
-              <a:t>of </a:t>
-            </a:r>
-            <a:r>
-              <a:rPr lang="en-US" dirty="0" smtClean="0"/>
-              <a:t>Electronics</a:t>
+              <a:t>User Manual</a:t>
+            </a:r>
+          </a:p>
+          <a:p>
+            <a:r>
+              <a:rPr lang="en-US" dirty="0" smtClean="0"/>
+              <a:t>Fundamentals of Electronics</a:t>
             </a:r>
             <a:endParaRPr lang="en-US" dirty="0"/>
           </a:p>
@@ -8814,14 +9161,12 @@
               <a:rPr lang="en-US" dirty="0" smtClean="0"/>
               <a:t>Specification</a:t>
             </a:r>
-            <a:endParaRPr lang="en-US" dirty="0" smtClean="0"/>
           </a:p>
           <a:p>
             <a:r>
               <a:rPr lang="en-US" dirty="0" smtClean="0"/>
               <a:t>Budget</a:t>
             </a:r>
-            <a:endParaRPr lang="en-US" dirty="0" smtClean="0"/>
           </a:p>
           <a:p>
             <a:r>
@@ -9170,22 +9515,14 @@
           <a:p>
             <a:r>
               <a:rPr lang="en-US" dirty="0" smtClean="0"/>
-              <a:t>Use </a:t>
-            </a:r>
-            <a:r>
-              <a:rPr lang="en-US" dirty="0" smtClean="0"/>
-              <a:t>Separate EEPROM</a:t>
+              <a:t>Use Separate EEPROM</a:t>
             </a:r>
           </a:p>
           <a:p>
             <a:pPr lvl="1"/>
             <a:r>
               <a:rPr lang="en-US" dirty="0" smtClean="0"/>
-              <a:t>Storage not Lost Due to Firmware </a:t>
-            </a:r>
-            <a:r>
-              <a:rPr lang="en-US" dirty="0" smtClean="0"/>
-              <a:t>Size</a:t>
+              <a:t>Storage not Lost Due to Firmware Size</a:t>
             </a:r>
           </a:p>
           <a:p>
@@ -9194,7 +9531,6 @@
               <a:rPr lang="en-US" dirty="0" smtClean="0"/>
               <a:t>Wear Leveling</a:t>
             </a:r>
-            <a:endParaRPr lang="en-US" dirty="0" smtClean="0"/>
           </a:p>
           <a:p>
             <a:r>
@@ -9206,13 +9542,8 @@
             <a:pPr lvl="1"/>
             <a:r>
               <a:rPr lang="en-US" dirty="0" smtClean="0"/>
-              <a:t>Button-Cell Battery </a:t>
-            </a:r>
-            <a:r>
-              <a:rPr lang="en-US" dirty="0" smtClean="0"/>
-              <a:t>Backup</a:t>
-            </a:r>
-            <a:endParaRPr lang="en-US" dirty="0" smtClean="0"/>
+              <a:t>Button-Cell Battery Backup</a:t>
+            </a:r>
           </a:p>
         </p:txBody>
       </p:sp>
@@ -9397,11 +9728,7 @@
           <a:p>
             <a:r>
               <a:rPr lang="en-US" dirty="0" smtClean="0"/>
-              <a:t>Power-Wire </a:t>
-            </a:r>
-            <a:r>
-              <a:rPr lang="en-US" dirty="0" smtClean="0"/>
-              <a:t>Strain Relief</a:t>
+              <a:t>Power-Wire Strain Relief</a:t>
             </a:r>
           </a:p>
           <a:p>
@@ -10605,13 +10932,8 @@
           <a:p>
             <a:r>
               <a:rPr lang="en-US" dirty="0" smtClean="0"/>
-              <a:t>Linear Power </a:t>
-            </a:r>
-            <a:r>
-              <a:rPr lang="en-US" dirty="0" smtClean="0"/>
-              <a:t>Supply</a:t>
-            </a:r>
-            <a:endParaRPr lang="en-US" dirty="0" smtClean="0"/>
+              <a:t>Linear Power Supply</a:t>
+            </a:r>
           </a:p>
           <a:p>
             <a:pPr lvl="1"/>

</xml_diff>